<commit_message>
Fixed strange conversion error with slide share
</commit_message>
<xml_diff>
--- a/portal/tutorials/network_view.pptx
+++ b/portal/tutorials/network_view.pptx
@@ -299,7 +299,7 @@
             <a:fld id="{7AB88265-6803-4045-8DA0-EB2F6067CE47}" type="datetimeFigureOut">
               <a:rPr lang="en-US" smtClean="0"/>
               <a:pPr/>
-              <a:t>12/13/11</a:t>
+              <a:t>12/16/11</a:t>
             </a:fld>
             <a:endParaRPr lang="en-US" dirty="0"/>
           </a:p>
@@ -466,7 +466,7 @@
             <a:fld id="{7AB88265-6803-4045-8DA0-EB2F6067CE47}" type="datetimeFigureOut">
               <a:rPr lang="en-US" smtClean="0"/>
               <a:pPr/>
-              <a:t>12/13/11</a:t>
+              <a:t>12/16/11</a:t>
             </a:fld>
             <a:endParaRPr lang="en-US" dirty="0"/>
           </a:p>
@@ -643,7 +643,7 @@
             <a:fld id="{7AB88265-6803-4045-8DA0-EB2F6067CE47}" type="datetimeFigureOut">
               <a:rPr lang="en-US" smtClean="0"/>
               <a:pPr/>
-              <a:t>12/13/11</a:t>
+              <a:t>12/16/11</a:t>
             </a:fld>
             <a:endParaRPr lang="en-US" dirty="0"/>
           </a:p>
@@ -810,7 +810,7 @@
             <a:fld id="{7AB88265-6803-4045-8DA0-EB2F6067CE47}" type="datetimeFigureOut">
               <a:rPr lang="en-US" smtClean="0"/>
               <a:pPr/>
-              <a:t>12/13/11</a:t>
+              <a:t>12/16/11</a:t>
             </a:fld>
             <a:endParaRPr lang="en-US" dirty="0"/>
           </a:p>
@@ -1053,7 +1053,7 @@
             <a:fld id="{7AB88265-6803-4045-8DA0-EB2F6067CE47}" type="datetimeFigureOut">
               <a:rPr lang="en-US" smtClean="0"/>
               <a:pPr/>
-              <a:t>12/13/11</a:t>
+              <a:t>12/16/11</a:t>
             </a:fld>
             <a:endParaRPr lang="en-US" dirty="0"/>
           </a:p>
@@ -1338,7 +1338,7 @@
             <a:fld id="{7AB88265-6803-4045-8DA0-EB2F6067CE47}" type="datetimeFigureOut">
               <a:rPr lang="en-US" smtClean="0"/>
               <a:pPr/>
-              <a:t>12/13/11</a:t>
+              <a:t>12/16/11</a:t>
             </a:fld>
             <a:endParaRPr lang="en-US" dirty="0"/>
           </a:p>
@@ -1757,7 +1757,7 @@
             <a:fld id="{7AB88265-6803-4045-8DA0-EB2F6067CE47}" type="datetimeFigureOut">
               <a:rPr lang="en-US" smtClean="0"/>
               <a:pPr/>
-              <a:t>12/13/11</a:t>
+              <a:t>12/16/11</a:t>
             </a:fld>
             <a:endParaRPr lang="en-US" dirty="0"/>
           </a:p>
@@ -1872,7 +1872,7 @@
             <a:fld id="{7AB88265-6803-4045-8DA0-EB2F6067CE47}" type="datetimeFigureOut">
               <a:rPr lang="en-US" smtClean="0"/>
               <a:pPr/>
-              <a:t>12/13/11</a:t>
+              <a:t>12/16/11</a:t>
             </a:fld>
             <a:endParaRPr lang="en-US" dirty="0"/>
           </a:p>
@@ -1964,7 +1964,7 @@
             <a:fld id="{7AB88265-6803-4045-8DA0-EB2F6067CE47}" type="datetimeFigureOut">
               <a:rPr lang="en-US" smtClean="0"/>
               <a:pPr/>
-              <a:t>12/13/11</a:t>
+              <a:t>12/16/11</a:t>
             </a:fld>
             <a:endParaRPr lang="en-US" dirty="0"/>
           </a:p>
@@ -2238,7 +2238,7 @@
             <a:fld id="{7AB88265-6803-4045-8DA0-EB2F6067CE47}" type="datetimeFigureOut">
               <a:rPr lang="en-US" smtClean="0"/>
               <a:pPr/>
-              <a:t>12/13/11</a:t>
+              <a:t>12/16/11</a:t>
             </a:fld>
             <a:endParaRPr lang="en-US" dirty="0"/>
           </a:p>
@@ -2488,7 +2488,7 @@
             <a:fld id="{7AB88265-6803-4045-8DA0-EB2F6067CE47}" type="datetimeFigureOut">
               <a:rPr lang="en-US" smtClean="0"/>
               <a:pPr/>
-              <a:t>12/13/11</a:t>
+              <a:t>12/16/11</a:t>
             </a:fld>
             <a:endParaRPr lang="en-US" dirty="0"/>
           </a:p>
@@ -2698,7 +2698,7 @@
             <a:fld id="{7AB88265-6803-4045-8DA0-EB2F6067CE47}" type="datetimeFigureOut">
               <a:rPr lang="en-US" smtClean="0"/>
               <a:pPr/>
-              <a:t>12/13/11</a:t>
+              <a:t>12/16/11</a:t>
             </a:fld>
             <a:endParaRPr lang="en-US" dirty="0"/>
           </a:p>
@@ -3086,7 +3086,7 @@
               </a:stretch>
             </p:blipFill>
           </mc:Choice>
-          <mc:Fallback xmlns:mc="http://schemas.openxmlformats.org/markup-compatibility/2006" xmlns:p="http://schemas.openxmlformats.org/presentationml/2006/main" xmlns:r="http://schemas.openxmlformats.org/officeDocument/2006/relationships" xmlns:a="http://schemas.openxmlformats.org/drawingml/2006/main" xmlns="">
+          <mc:Fallback xmlns:mv="urn:schemas-microsoft-com:mac:vml" xmlns:mc="http://schemas.openxmlformats.org/markup-compatibility/2006" xmlns:p="http://schemas.openxmlformats.org/presentationml/2006/main" xmlns:r="http://schemas.openxmlformats.org/officeDocument/2006/relationships" xmlns:a="http://schemas.openxmlformats.org/drawingml/2006/main" xmlns="" xmlns:ma="http://schemas.microsoft.com/office/mac/drawingml/2008/main">
             <p:blipFill>
               <a:blip r:embed="rId3"/>
               <a:stretch>
@@ -3622,7 +3622,6 @@
               <a:rPr lang="en-US" sz="4800" dirty="0" smtClean="0"/>
               <a:t>cancergenomics@cbio.mskcc.org</a:t>
             </a:r>
-            <a:endParaRPr lang="en-US" sz="4800" dirty="0" smtClean="0"/>
           </a:p>
           <a:p>
             <a:pPr>
@@ -5927,8 +5926,8 @@
         </p:nvSpPr>
         <p:spPr>
           <a:xfrm>
-            <a:off x="5568481" y="4169172"/>
-            <a:ext cx="3285005" cy="1212453"/>
+            <a:off x="4450881" y="5257799"/>
+            <a:ext cx="4286719" cy="1435101"/>
           </a:xfrm>
           <a:prstGeom prst="roundRect">
             <a:avLst/>
@@ -5967,14 +5966,14 @@
       </p:sp>
       <p:sp>
         <p:nvSpPr>
-          <p:cNvPr id="48" name="TextBox 47"/>
+          <p:cNvPr id="6" name="TextBox 5"/>
           <p:cNvSpPr txBox="1"/>
           <p:nvPr/>
         </p:nvSpPr>
         <p:spPr>
           <a:xfrm>
-            <a:off x="5567361" y="4179853"/>
-            <a:ext cx="3295651" cy="1181520"/>
+            <a:off x="4648200" y="5334000"/>
+            <a:ext cx="4025900" cy="1384995"/>
           </a:xfrm>
           <a:prstGeom prst="rect">
             <a:avLst/>
@@ -5987,52 +5986,15 @@
           </a:bodyPr>
           <a:lstStyle/>
           <a:p>
-            <a:pPr>
-              <a:lnSpc>
-                <a:spcPts val="2800"/>
-              </a:lnSpc>
-            </a:pPr>
             <a:r>
               <a:rPr lang="en-US" sz="2800" b="1" dirty="0" smtClean="0">
                 <a:solidFill>
                   <a:schemeClr val="accent2"/>
                 </a:solidFill>
               </a:rPr>
-              <a:t>Partial RB pathway with</a:t>
-            </a:r>
-            <a:r>
-              <a:rPr lang="en-US" sz="2800" b="1" dirty="0" smtClean="0">
-                <a:solidFill>
-                  <a:schemeClr val="accent2"/>
-                </a:solidFill>
-              </a:rPr>
-              <a:t> </a:t>
-            </a:r>
-            <a:r>
-              <a:rPr lang="en-US" sz="2800" b="1" dirty="0" smtClean="0">
-                <a:solidFill>
-                  <a:schemeClr val="accent2"/>
-                </a:solidFill>
-              </a:rPr>
-              <a:t>Glioblostama</a:t>
-            </a:r>
-            <a:r>
-              <a:rPr lang="en-US" sz="2800" b="1" dirty="0" smtClean="0">
-                <a:solidFill>
-                  <a:schemeClr val="accent2"/>
-                </a:solidFill>
-              </a:rPr>
-              <a:t> genomic </a:t>
-            </a:r>
-            <a:r>
-              <a:rPr lang="en-US" sz="2800" b="1" dirty="0" smtClean="0">
-                <a:solidFill>
-                  <a:schemeClr val="accent2"/>
-                </a:solidFill>
-              </a:rPr>
-              <a:t>profile data</a:t>
-            </a:r>
-            <a:endParaRPr lang="en-US" sz="2800" dirty="0">
+              <a:t>Partial RB pathway with GBM genomic profile data.</a:t>
+            </a:r>
+            <a:endParaRPr lang="en-US" sz="2800" b="1" dirty="0">
               <a:solidFill>
                 <a:schemeClr val="accent2"/>
               </a:solidFill>

</xml_diff>